<commit_message>
add final to slides1f
</commit_message>
<xml_diff>
--- a/fall11/slidesF11/slides1f.pptx
+++ b/fall11/slidesF11/slides1f.pptx
@@ -6,10 +6,10 @@
     <p:sldMasterId id="2147483651" r:id="rId2"/>
   </p:sldMasterIdLst>
   <p:notesMasterIdLst>
-    <p:notesMasterId r:id="rId37"/>
+    <p:notesMasterId r:id="rId38"/>
   </p:notesMasterIdLst>
   <p:handoutMasterIdLst>
-    <p:handoutMasterId r:id="rId38"/>
+    <p:handoutMasterId r:id="rId39"/>
   </p:handoutMasterIdLst>
   <p:sldIdLst>
     <p:sldId id="404" r:id="rId3"/>
@@ -46,11 +46,12 @@
     <p:sldId id="470" r:id="rId34"/>
     <p:sldId id="473" r:id="rId35"/>
     <p:sldId id="474" r:id="rId36"/>
+    <p:sldId id="475" r:id="rId37"/>
   </p:sldIdLst>
   <p:sldSz cx="9144000" cy="6858000" type="screen4x3"/>
   <p:notesSz cx="7315200" cy="9601200"/>
   <p:custDataLst>
-    <p:tags r:id="rId40"/>
+    <p:tags r:id="rId41"/>
   </p:custDataLst>
   <p:defaultTextStyle>
     <a:defPPr>
@@ -10825,7 +10826,7 @@
             <a:graphicData uri="http://schemas.openxmlformats.org/presentationml/2006/ole">
               <mc:AlternateContent xmlns:mc="http://schemas.openxmlformats.org/markup-compatibility/2006">
                 <mc:Choice xmlns:v="urn:schemas-microsoft-com:vml" Requires="v">
-                  <p:oleObj spid="_x0000_s350226" name="Equation" r:id="rId4" imgW="228600" imgH="457200" progId="Equation.DSMT4">
+                  <p:oleObj spid="_x0000_s350231" name="Equation" r:id="rId4" imgW="228600" imgH="457200" progId="Equation.DSMT4">
                     <p:embed/>
                   </p:oleObj>
                 </mc:Choice>
@@ -10946,7 +10947,7 @@
             <a:graphicData uri="http://schemas.openxmlformats.org/presentationml/2006/ole">
               <mc:AlternateContent xmlns:mc="http://schemas.openxmlformats.org/markup-compatibility/2006">
                 <mc:Choice xmlns:v="urn:schemas-microsoft-com:vml" Requires="v">
-                  <p:oleObj spid="_x0000_s350227" name="Equation" r:id="rId6" imgW="279400" imgH="457200" progId="Equation.DSMT4">
+                  <p:oleObj spid="_x0000_s350232" name="Equation" r:id="rId6" imgW="279400" imgH="457200" progId="Equation.DSMT4">
                     <p:embed/>
                   </p:oleObj>
                 </mc:Choice>
@@ -11716,7 +11717,7 @@
           <a:graphicData uri="http://schemas.openxmlformats.org/presentationml/2006/ole">
             <mc:AlternateContent xmlns:mc="http://schemas.openxmlformats.org/markup-compatibility/2006">
               <mc:Choice xmlns:v="urn:schemas-microsoft-com:vml" Requires="v">
-                <p:oleObj spid="_x0000_s352290" name="Equation" r:id="rId4" imgW="139700" imgH="228600" progId="Equation.DSMT4">
+                <p:oleObj spid="_x0000_s352299" name="Equation" r:id="rId4" imgW="139700" imgH="228600" progId="Equation.DSMT4">
                   <p:embed/>
                 </p:oleObj>
               </mc:Choice>
@@ -11968,7 +11969,7 @@
               <a:graphicData uri="http://schemas.openxmlformats.org/presentationml/2006/ole">
                 <mc:AlternateContent xmlns:mc="http://schemas.openxmlformats.org/markup-compatibility/2006">
                   <mc:Choice xmlns:v="urn:schemas-microsoft-com:vml" Requires="v">
-                    <p:oleObj spid="_x0000_s352291" name="Equation" r:id="rId6" imgW="228600" imgH="457200" progId="Equation.DSMT4">
+                    <p:oleObj spid="_x0000_s352300" name="Equation" r:id="rId6" imgW="228600" imgH="457200" progId="Equation.DSMT4">
                       <p:embed/>
                     </p:oleObj>
                   </mc:Choice>
@@ -12089,7 +12090,7 @@
               <a:graphicData uri="http://schemas.openxmlformats.org/presentationml/2006/ole">
                 <mc:AlternateContent xmlns:mc="http://schemas.openxmlformats.org/markup-compatibility/2006">
                   <mc:Choice xmlns:v="urn:schemas-microsoft-com:vml" Requires="v">
-                    <p:oleObj spid="_x0000_s352292" name="Equation" r:id="rId8" imgW="228600" imgH="457200" progId="Equation.DSMT4">
+                    <p:oleObj spid="_x0000_s352301" name="Equation" r:id="rId8" imgW="228600" imgH="457200" progId="Equation.DSMT4">
                       <p:embed/>
                     </p:oleObj>
                   </mc:Choice>
@@ -12210,7 +12211,7 @@
               <a:graphicData uri="http://schemas.openxmlformats.org/presentationml/2006/ole">
                 <mc:AlternateContent xmlns:mc="http://schemas.openxmlformats.org/markup-compatibility/2006">
                   <mc:Choice xmlns:v="urn:schemas-microsoft-com:vml" Requires="v">
-                    <p:oleObj spid="_x0000_s352293" name="Equation" r:id="rId10" imgW="279400" imgH="457200" progId="Equation.DSMT4">
+                    <p:oleObj spid="_x0000_s352302" name="Equation" r:id="rId10" imgW="279400" imgH="457200" progId="Equation.DSMT4">
                       <p:embed/>
                     </p:oleObj>
                   </mc:Choice>
@@ -13102,7 +13103,7 @@
               <a:graphicData uri="http://schemas.openxmlformats.org/presentationml/2006/ole">
                 <mc:AlternateContent xmlns:mc="http://schemas.openxmlformats.org/markup-compatibility/2006">
                   <mc:Choice xmlns:v="urn:schemas-microsoft-com:vml" Requires="v">
-                    <p:oleObj spid="_x0000_s354329" name="Equation" r:id="rId4" imgW="228600" imgH="457200" progId="Equation.DSMT4">
+                    <p:oleObj spid="_x0000_s354336" name="Equation" r:id="rId4" imgW="228600" imgH="457200" progId="Equation.DSMT4">
                       <p:embed/>
                     </p:oleObj>
                   </mc:Choice>
@@ -13223,7 +13224,7 @@
               <a:graphicData uri="http://schemas.openxmlformats.org/presentationml/2006/ole">
                 <mc:AlternateContent xmlns:mc="http://schemas.openxmlformats.org/markup-compatibility/2006">
                   <mc:Choice xmlns:v="urn:schemas-microsoft-com:vml" Requires="v">
-                    <p:oleObj spid="_x0000_s354330" name="Equation" r:id="rId6" imgW="228600" imgH="457200" progId="Equation.DSMT4">
+                    <p:oleObj spid="_x0000_s354337" name="Equation" r:id="rId6" imgW="228600" imgH="457200" progId="Equation.DSMT4">
                       <p:embed/>
                     </p:oleObj>
                   </mc:Choice>
@@ -13344,7 +13345,7 @@
               <a:graphicData uri="http://schemas.openxmlformats.org/presentationml/2006/ole">
                 <mc:AlternateContent xmlns:mc="http://schemas.openxmlformats.org/markup-compatibility/2006">
                   <mc:Choice xmlns:v="urn:schemas-microsoft-com:vml" Requires="v">
-                    <p:oleObj spid="_x0000_s354331" name="Equation" r:id="rId8" imgW="279400" imgH="457200" progId="Equation.DSMT4">
+                    <p:oleObj spid="_x0000_s354338" name="Equation" r:id="rId8" imgW="279400" imgH="457200" progId="Equation.DSMT4">
                       <p:embed/>
                     </p:oleObj>
                   </mc:Choice>
@@ -13946,7 +13947,7 @@
             <a:graphicData uri="http://schemas.openxmlformats.org/presentationml/2006/ole">
               <mc:AlternateContent xmlns:mc="http://schemas.openxmlformats.org/markup-compatibility/2006">
                 <mc:Choice xmlns:v="urn:schemas-microsoft-com:vml" Requires="v">
-                  <p:oleObj spid="_x0000_s356366" name="Equation" r:id="rId4" imgW="279400" imgH="457200" progId="Equation.DSMT4">
+                  <p:oleObj spid="_x0000_s356369" name="Equation" r:id="rId4" imgW="279400" imgH="457200" progId="Equation.DSMT4">
                     <p:embed/>
                   </p:oleObj>
                 </mc:Choice>
@@ -20303,7 +20304,7 @@
           <a:graphicData uri="http://schemas.openxmlformats.org/presentationml/2006/ole">
             <mc:AlternateContent xmlns:mc="http://schemas.openxmlformats.org/markup-compatibility/2006">
               <mc:Choice xmlns:v="urn:schemas-microsoft-com:vml" Requires="v">
-                <p:oleObj spid="_x0000_s334881" name="Equation" r:id="rId4" imgW="241200" imgH="419040" progId="Equation.DSMT4">
+                <p:oleObj spid="_x0000_s334890" name="Equation" r:id="rId4" imgW="241200" imgH="419040" progId="Equation.DSMT4">
                   <p:embed/>
                 </p:oleObj>
               </mc:Choice>
@@ -20373,7 +20374,7 @@
           <a:graphicData uri="http://schemas.openxmlformats.org/presentationml/2006/ole">
             <mc:AlternateContent xmlns:mc="http://schemas.openxmlformats.org/markup-compatibility/2006">
               <mc:Choice xmlns:v="urn:schemas-microsoft-com:vml" Requires="v">
-                <p:oleObj spid="_x0000_s334882" name="Equation" r:id="rId6" imgW="3035160" imgH="533160" progId="Equation.DSMT4">
+                <p:oleObj spid="_x0000_s334891" name="Equation" r:id="rId6" imgW="3035160" imgH="533160" progId="Equation.DSMT4">
                   <p:embed/>
                 </p:oleObj>
               </mc:Choice>
@@ -20443,7 +20444,7 @@
           <a:graphicData uri="http://schemas.openxmlformats.org/presentationml/2006/ole">
             <mc:AlternateContent xmlns:mc="http://schemas.openxmlformats.org/markup-compatibility/2006">
               <mc:Choice xmlns:v="urn:schemas-microsoft-com:vml" Requires="v">
-                <p:oleObj spid="_x0000_s334883" name="Equation" r:id="rId8" imgW="901440" imgH="355320" progId="Equation.DSMT4">
+                <p:oleObj spid="_x0000_s334892" name="Equation" r:id="rId8" imgW="901440" imgH="355320" progId="Equation.DSMT4">
                   <p:embed/>
                 </p:oleObj>
               </mc:Choice>
@@ -20529,7 +20530,7 @@
           <a:graphicData uri="http://schemas.openxmlformats.org/presentationml/2006/ole">
             <mc:AlternateContent xmlns:mc="http://schemas.openxmlformats.org/markup-compatibility/2006">
               <mc:Choice xmlns:v="urn:schemas-microsoft-com:vml" Requires="v">
-                <p:oleObj spid="_x0000_s334884" name="Equation" r:id="rId10" imgW="3695700" imgH="673100" progId="Equation.DSMT4">
+                <p:oleObj spid="_x0000_s334893" name="Equation" r:id="rId10" imgW="3695700" imgH="673100" progId="Equation.DSMT4">
                   <p:embed/>
                 </p:oleObj>
               </mc:Choice>
@@ -27044,7 +27045,7 @@
           <a:graphicData uri="http://schemas.openxmlformats.org/presentationml/2006/ole">
             <mc:AlternateContent xmlns:mc="http://schemas.openxmlformats.org/markup-compatibility/2006">
               <mc:Choice xmlns:v="urn:schemas-microsoft-com:vml" Requires="v">
-                <p:oleObj spid="_x0000_s332839" name="Equation" r:id="rId4" imgW="558720" imgH="190440" progId="Equation.DSMT4">
+                <p:oleObj spid="_x0000_s332850" name="Equation" r:id="rId4" imgW="558720" imgH="190440" progId="Equation.DSMT4">
                   <p:embed/>
                 </p:oleObj>
               </mc:Choice>
@@ -27114,7 +27115,7 @@
           <a:graphicData uri="http://schemas.openxmlformats.org/presentationml/2006/ole">
             <mc:AlternateContent xmlns:mc="http://schemas.openxmlformats.org/markup-compatibility/2006">
               <mc:Choice xmlns:v="urn:schemas-microsoft-com:vml" Requires="v">
-                <p:oleObj spid="_x0000_s332840" name="Equation" r:id="rId6" imgW="545760" imgH="177480" progId="Equation.DSMT4">
+                <p:oleObj spid="_x0000_s332851" name="Equation" r:id="rId6" imgW="545760" imgH="177480" progId="Equation.DSMT4">
                   <p:embed/>
                 </p:oleObj>
               </mc:Choice>
@@ -27184,7 +27185,7 @@
           <a:graphicData uri="http://schemas.openxmlformats.org/presentationml/2006/ole">
             <mc:AlternateContent xmlns:mc="http://schemas.openxmlformats.org/markup-compatibility/2006">
               <mc:Choice xmlns:v="urn:schemas-microsoft-com:vml" Requires="v">
-                <p:oleObj spid="_x0000_s332841" name="Equation" r:id="rId8" imgW="545760" imgH="177480" progId="Equation.DSMT4">
+                <p:oleObj spid="_x0000_s332852" name="Equation" r:id="rId8" imgW="545760" imgH="177480" progId="Equation.DSMT4">
                   <p:embed/>
                 </p:oleObj>
               </mc:Choice>
@@ -27293,7 +27294,7 @@
           <a:graphicData uri="http://schemas.openxmlformats.org/presentationml/2006/ole">
             <mc:AlternateContent xmlns:mc="http://schemas.openxmlformats.org/markup-compatibility/2006">
               <mc:Choice xmlns:v="urn:schemas-microsoft-com:vml" Requires="v">
-                <p:oleObj spid="_x0000_s332842" name="Equation" r:id="rId10" imgW="444240" imgH="368280" progId="Equation.DSMT4">
+                <p:oleObj spid="_x0000_s332853" name="Equation" r:id="rId10" imgW="444240" imgH="368280" progId="Equation.DSMT4">
                   <p:embed/>
                 </p:oleObj>
               </mc:Choice>
@@ -27363,7 +27364,7 @@
           <a:graphicData uri="http://schemas.openxmlformats.org/presentationml/2006/ole">
             <mc:AlternateContent xmlns:mc="http://schemas.openxmlformats.org/markup-compatibility/2006">
               <mc:Choice xmlns:v="urn:schemas-microsoft-com:vml" Requires="v">
-                <p:oleObj spid="_x0000_s332843" name="Equation" r:id="rId12" imgW="406080" imgH="177480" progId="Equation.DSMT4">
+                <p:oleObj spid="_x0000_s332854" name="Equation" r:id="rId12" imgW="406080" imgH="177480" progId="Equation.DSMT4">
                   <p:embed/>
                 </p:oleObj>
               </mc:Choice>
@@ -28194,7 +28195,7 @@
           <a:graphicData uri="http://schemas.openxmlformats.org/presentationml/2006/ole">
             <mc:AlternateContent xmlns:mc="http://schemas.openxmlformats.org/markup-compatibility/2006">
               <mc:Choice xmlns:v="urn:schemas-microsoft-com:vml" Requires="v">
-                <p:oleObj spid="_x0000_s327691" name="Equation" r:id="rId4" imgW="914400" imgH="406080" progId="Equation.DSMT4">
+                <p:oleObj spid="_x0000_s327694" name="Equation" r:id="rId4" imgW="914400" imgH="406080" progId="Equation.DSMT4">
                   <p:embed/>
                 </p:oleObj>
               </mc:Choice>
@@ -29297,12 +29298,6 @@
               </a:rPr>
               <a:t>USUALLY</a:t>
             </a:r>
-            <a:endParaRPr lang="en-US" sz="4400" dirty="0" smtClean="0">
-              <a:solidFill>
-                <a:srgbClr val="008000"/>
-              </a:solidFill>
-              <a:latin typeface="Comic Sans MS" pitchFamily="66" charset="0"/>
-            </a:endParaRPr>
           </a:p>
           <a:p>
             <a:pPr algn="l"/>
@@ -29960,9 +29955,6 @@
               </a:rPr>
               <a:t>deal with unpleasant people</a:t>
             </a:r>
-            <a:endParaRPr lang="en-US" sz="4400" dirty="0" smtClean="0">
-              <a:latin typeface="Comic Sans MS" pitchFamily="66" charset="0"/>
-            </a:endParaRPr>
           </a:p>
         </p:txBody>
       </p:sp>
@@ -29997,12 +29989,6 @@
               </a:rPr>
               <a:t>prepared!</a:t>
             </a:r>
-            <a:endParaRPr lang="en-US" sz="4800" dirty="0" smtClean="0">
-              <a:solidFill>
-                <a:srgbClr val="FF6600"/>
-              </a:solidFill>
-              <a:latin typeface="Comic Sans MS" pitchFamily="66" charset="0"/>
-            </a:endParaRPr>
           </a:p>
         </p:txBody>
       </p:sp>
@@ -30511,6 +30497,182 @@
 </p:sld>
 </file>
 
+<file path=ppt/slides/slide35.xml><?xml version="1.0" encoding="utf-8"?>
+<p:sld xmlns:a="http://schemas.openxmlformats.org/drawingml/2006/main" xmlns:r="http://schemas.openxmlformats.org/officeDocument/2006/relationships" xmlns:p="http://schemas.openxmlformats.org/presentationml/2006/main">
+  <p:cSld>
+    <p:spTree>
+      <p:nvGrpSpPr>
+        <p:cNvPr id="1" name=""/>
+        <p:cNvGrpSpPr/>
+        <p:nvPr/>
+      </p:nvGrpSpPr>
+      <p:grpSpPr>
+        <a:xfrm>
+          <a:off x="0" y="0"/>
+          <a:ext cx="0" cy="0"/>
+          <a:chOff x="0" y="0"/>
+          <a:chExt cx="0" cy="0"/>
+        </a:xfrm>
+      </p:grpSpPr>
+      <p:sp>
+        <p:nvSpPr>
+          <p:cNvPr id="3" name="Slide Number Placeholder 2"/>
+          <p:cNvSpPr>
+            <a:spLocks noGrp="1"/>
+          </p:cNvSpPr>
+          <p:nvPr>
+            <p:ph type="sldNum" sz="quarter" idx="10"/>
+          </p:nvPr>
+        </p:nvSpPr>
+        <p:spPr/>
+        <p:txBody>
+          <a:bodyPr/>
+          <a:lstStyle/>
+          <a:p>
+            <a:pPr>
+              <a:defRPr/>
+            </a:pPr>
+            <a:r>
+              <a:rPr lang="en-US" smtClean="0"/>
+              <a:t>lec 2M.</a:t>
+            </a:r>
+            <a:fld id="{DB6F0ED6-FEF5-4C9C-B1CC-29B47EC66FAA}" type="slidenum">
+              <a:rPr lang="en-US" smtClean="0"/>
+              <a:pPr>
+                <a:defRPr/>
+              </a:pPr>
+              <a:t>35</a:t>
+            </a:fld>
+            <a:endParaRPr lang="en-US" dirty="0"/>
+          </a:p>
+        </p:txBody>
+      </p:sp>
+      <p:sp>
+        <p:nvSpPr>
+          <p:cNvPr id="4" name="Title 1"/>
+          <p:cNvSpPr>
+            <a:spLocks noGrp="1"/>
+          </p:cNvSpPr>
+          <p:nvPr>
+            <p:ph type="title"/>
+          </p:nvPr>
+        </p:nvSpPr>
+        <p:spPr>
+          <a:xfrm>
+            <a:off x="1447800" y="304798"/>
+            <a:ext cx="5904037" cy="1197154"/>
+          </a:xfrm>
+        </p:spPr>
+        <p:txBody>
+          <a:bodyPr/>
+          <a:lstStyle/>
+          <a:p>
+            <a:pPr algn="ctr"/>
+            <a:r>
+              <a:rPr lang="en-US" sz="4000" dirty="0" smtClean="0"/>
+              <a:t>Teamwork</a:t>
+            </a:r>
+            <a:endParaRPr lang="en-US" sz="4000" dirty="0"/>
+          </a:p>
+        </p:txBody>
+      </p:sp>
+      <p:sp>
+        <p:nvSpPr>
+          <p:cNvPr id="5" name="TextBox 4"/>
+          <p:cNvSpPr txBox="1"/>
+          <p:nvPr/>
+        </p:nvSpPr>
+        <p:spPr>
+          <a:xfrm>
+            <a:off x="988122" y="1325901"/>
+            <a:ext cx="7072031" cy="4708981"/>
+          </a:xfrm>
+          <a:prstGeom prst="rect">
+            <a:avLst/>
+          </a:prstGeom>
+          <a:noFill/>
+        </p:spPr>
+        <p:txBody>
+          <a:bodyPr wrap="square" rtlCol="0">
+            <a:spAutoFit/>
+          </a:bodyPr>
+          <a:lstStyle/>
+          <a:p>
+            <a:pPr algn="l"/>
+            <a:r>
+              <a:rPr lang="en-US" sz="6000" dirty="0" smtClean="0">
+                <a:latin typeface="Comic Sans MS" pitchFamily="66" charset="0"/>
+              </a:rPr>
+              <a:t>Your TA/LA will be working to bring out the </a:t>
+            </a:r>
+            <a:r>
+              <a:rPr lang="en-US" sz="6000" dirty="0" smtClean="0">
+                <a:solidFill>
+                  <a:srgbClr val="006600"/>
+                </a:solidFill>
+                <a:latin typeface="Comic Sans MS" pitchFamily="66" charset="0"/>
+              </a:rPr>
+              <a:t>good</a:t>
+            </a:r>
+            <a:r>
+              <a:rPr lang="en-US" sz="6000" dirty="0" smtClean="0">
+                <a:latin typeface="Comic Sans MS" pitchFamily="66" charset="0"/>
+              </a:rPr>
+              <a:t> and </a:t>
+            </a:r>
+            <a:r>
+              <a:rPr lang="en-US" sz="6000" dirty="0" smtClean="0">
+                <a:latin typeface="Comic Sans MS" pitchFamily="66" charset="0"/>
+              </a:rPr>
+              <a:t>control the </a:t>
+            </a:r>
+            <a:r>
+              <a:rPr lang="en-US" sz="6000" dirty="0" smtClean="0">
+                <a:solidFill>
+                  <a:srgbClr val="FF0000"/>
+                </a:solidFill>
+                <a:latin typeface="Comic Sans MS" pitchFamily="66" charset="0"/>
+              </a:rPr>
+              <a:t>bad</a:t>
+            </a:r>
+          </a:p>
+          <a:p>
+            <a:r>
+              <a:rPr lang="en-US" sz="6000" dirty="0" smtClean="0">
+                <a:solidFill>
+                  <a:schemeClr val="accent1">
+                    <a:lumMod val="75000"/>
+                  </a:schemeClr>
+                </a:solidFill>
+                <a:latin typeface="Comic Sans MS" pitchFamily="66" charset="0"/>
+              </a:rPr>
+              <a:t>(me too)</a:t>
+            </a:r>
+            <a:endParaRPr lang="en-US" sz="6000" dirty="0" smtClean="0">
+              <a:solidFill>
+                <a:schemeClr val="accent1">
+                  <a:lumMod val="75000"/>
+                </a:schemeClr>
+              </a:solidFill>
+              <a:latin typeface="Comic Sans MS" pitchFamily="66" charset="0"/>
+            </a:endParaRPr>
+          </a:p>
+        </p:txBody>
+      </p:sp>
+    </p:spTree>
+    <p:extLst>
+      <p:ext uri="{BB962C8B-B14F-4D97-AF65-F5344CB8AC3E}">
+        <p14:creationId xmlns:p14="http://schemas.microsoft.com/office/powerpoint/2010/main" val="2136616454"/>
+      </p:ext>
+    </p:extLst>
+  </p:cSld>
+  <p:clrMapOvr>
+    <a:masterClrMapping/>
+  </p:clrMapOvr>
+  <p:transition xmlns:p14="http://schemas.microsoft.com/office/powerpoint/2010/main"/>
+</p:sld>
+</file>
+
 <file path=ppt/slides/slide4.xml><?xml version="1.0" encoding="utf-8"?>
 <p:sld xmlns:a="http://schemas.openxmlformats.org/drawingml/2006/main" xmlns:r="http://schemas.openxmlformats.org/officeDocument/2006/relationships" xmlns:p="http://schemas.openxmlformats.org/presentationml/2006/main">
   <p:cSld>
@@ -30544,7 +30706,7 @@
           <a:graphicData uri="http://schemas.openxmlformats.org/presentationml/2006/ole">
             <mc:AlternateContent xmlns:mc="http://schemas.openxmlformats.org/markup-compatibility/2006">
               <mc:Choice xmlns:v="urn:schemas-microsoft-com:vml" Requires="v">
-                <p:oleObj spid="_x0000_s337964" name="Equation" r:id="rId4" imgW="2984500" imgH="596900" progId="Equation.DSMT4">
+                <p:oleObj spid="_x0000_s337975" name="Equation" r:id="rId4" imgW="2984500" imgH="596900" progId="Equation.DSMT4">
                   <p:embed/>
                 </p:oleObj>
               </mc:Choice>
@@ -30637,7 +30799,7 @@
           <a:graphicData uri="http://schemas.openxmlformats.org/presentationml/2006/ole">
             <mc:AlternateContent xmlns:mc="http://schemas.openxmlformats.org/markup-compatibility/2006">
               <mc:Choice xmlns:v="urn:schemas-microsoft-com:vml" Requires="v">
-                <p:oleObj spid="_x0000_s337965" name="Equation" r:id="rId6" imgW="3759200" imgH="673100" progId="Equation.DSMT4">
+                <p:oleObj spid="_x0000_s337976" name="Equation" r:id="rId6" imgW="3759200" imgH="673100" progId="Equation.DSMT4">
                   <p:embed/>
                 </p:oleObj>
               </mc:Choice>
@@ -30757,7 +30919,7 @@
           <a:graphicData uri="http://schemas.openxmlformats.org/presentationml/2006/ole">
             <mc:AlternateContent xmlns:mc="http://schemas.openxmlformats.org/markup-compatibility/2006">
               <mc:Choice xmlns:v="urn:schemas-microsoft-com:vml" Requires="v">
-                <p:oleObj spid="_x0000_s337966" name="Equation" r:id="rId8" imgW="253800" imgH="317160" progId="Equation.DSMT4">
+                <p:oleObj spid="_x0000_s337977" name="Equation" r:id="rId8" imgW="253800" imgH="317160" progId="Equation.DSMT4">
                   <p:embed/>
                 </p:oleObj>
               </mc:Choice>
@@ -30820,7 +30982,7 @@
           <a:graphicData uri="http://schemas.openxmlformats.org/presentationml/2006/ole">
             <mc:AlternateContent xmlns:mc="http://schemas.openxmlformats.org/markup-compatibility/2006">
               <mc:Choice xmlns:v="urn:schemas-microsoft-com:vml" Requires="v">
-                <p:oleObj spid="_x0000_s337967" name="Equation" r:id="rId10" imgW="2057400" imgH="533160" progId="Equation.DSMT4">
+                <p:oleObj spid="_x0000_s337978" name="Equation" r:id="rId10" imgW="2057400" imgH="533160" progId="Equation.DSMT4">
                   <p:embed/>
                 </p:oleObj>
               </mc:Choice>
@@ -30937,7 +31099,7 @@
           <a:graphicData uri="http://schemas.openxmlformats.org/presentationml/2006/ole">
             <mc:AlternateContent xmlns:mc="http://schemas.openxmlformats.org/markup-compatibility/2006">
               <mc:Choice xmlns:v="urn:schemas-microsoft-com:vml" Requires="v">
-                <p:oleObj spid="_x0000_s337968" name="Equation" r:id="rId12" imgW="876300" imgH="368300" progId="Equation.DSMT4">
+                <p:oleObj spid="_x0000_s337979" name="Equation" r:id="rId12" imgW="876300" imgH="368300" progId="Equation.DSMT4">
                   <p:embed/>
                 </p:oleObj>
               </mc:Choice>
@@ -31811,7 +31973,7 @@
           <a:graphicData uri="http://schemas.openxmlformats.org/presentationml/2006/ole">
             <mc:AlternateContent xmlns:mc="http://schemas.openxmlformats.org/markup-compatibility/2006">
               <mc:Choice xmlns:v="urn:schemas-microsoft-com:vml" Requires="v">
-                <p:oleObj spid="_x0000_s248860" name="Equation" r:id="rId4" imgW="241200" imgH="215640" progId="Equation.DSMT4">
+                <p:oleObj spid="_x0000_s248867" name="Equation" r:id="rId4" imgW="241200" imgH="215640" progId="Equation.DSMT4">
                   <p:embed/>
                 </p:oleObj>
               </mc:Choice>
@@ -31881,7 +32043,7 @@
           <a:graphicData uri="http://schemas.openxmlformats.org/presentationml/2006/ole">
             <mc:AlternateContent xmlns:mc="http://schemas.openxmlformats.org/markup-compatibility/2006">
               <mc:Choice xmlns:v="urn:schemas-microsoft-com:vml" Requires="v">
-                <p:oleObj spid="_x0000_s248861" name="Equation" r:id="rId6" imgW="241200" imgH="215640" progId="Equation.DSMT4">
+                <p:oleObj spid="_x0000_s248868" name="Equation" r:id="rId6" imgW="241200" imgH="215640" progId="Equation.DSMT4">
                   <p:embed/>
                 </p:oleObj>
               </mc:Choice>
@@ -31951,7 +32113,7 @@
           <a:graphicData uri="http://schemas.openxmlformats.org/presentationml/2006/ole">
             <mc:AlternateContent xmlns:mc="http://schemas.openxmlformats.org/markup-compatibility/2006">
               <mc:Choice xmlns:v="urn:schemas-microsoft-com:vml" Requires="v">
-                <p:oleObj spid="_x0000_s248862" name="Equation" r:id="rId8" imgW="507960" imgH="419040" progId="Equation.DSMT4">
+                <p:oleObj spid="_x0000_s248869" name="Equation" r:id="rId8" imgW="507960" imgH="419040" progId="Equation.DSMT4">
                   <p:embed/>
                 </p:oleObj>
               </mc:Choice>
@@ -32457,7 +32619,7 @@
           <a:graphicData uri="http://schemas.openxmlformats.org/presentationml/2006/ole">
             <mc:AlternateContent xmlns:mc="http://schemas.openxmlformats.org/markup-compatibility/2006">
               <mc:Choice xmlns:v="urn:schemas-microsoft-com:vml" Requires="v">
-                <p:oleObj spid="_x0000_s237636" name="Equation" r:id="rId4" imgW="431640" imgH="190440" progId="Equation.DSMT4">
+                <p:oleObj spid="_x0000_s237655" name="Equation" r:id="rId4" imgW="431640" imgH="190440" progId="Equation.DSMT4">
                   <p:embed/>
                 </p:oleObj>
               </mc:Choice>
@@ -32566,7 +32728,7 @@
           <a:graphicData uri="http://schemas.openxmlformats.org/presentationml/2006/ole">
             <mc:AlternateContent xmlns:mc="http://schemas.openxmlformats.org/markup-compatibility/2006">
               <mc:Choice xmlns:v="urn:schemas-microsoft-com:vml" Requires="v">
-                <p:oleObj spid="_x0000_s237637" name="Equation" r:id="rId6" imgW="571320" imgH="203040" progId="Equation.DSMT4">
+                <p:oleObj spid="_x0000_s237656" name="Equation" r:id="rId6" imgW="571320" imgH="203040" progId="Equation.DSMT4">
                   <p:embed/>
                 </p:oleObj>
               </mc:Choice>
@@ -32636,7 +32798,7 @@
           <a:graphicData uri="http://schemas.openxmlformats.org/presentationml/2006/ole">
             <mc:AlternateContent xmlns:mc="http://schemas.openxmlformats.org/markup-compatibility/2006">
               <mc:Choice xmlns:v="urn:schemas-microsoft-com:vml" Requires="v">
-                <p:oleObj spid="_x0000_s237638" name="Equation" r:id="rId8" imgW="583920" imgH="215640" progId="Equation.DSMT4">
+                <p:oleObj spid="_x0000_s237657" name="Equation" r:id="rId8" imgW="583920" imgH="215640" progId="Equation.DSMT4">
                   <p:embed/>
                 </p:oleObj>
               </mc:Choice>
@@ -32806,7 +32968,7 @@
           <a:graphicData uri="http://schemas.openxmlformats.org/presentationml/2006/ole">
             <mc:AlternateContent xmlns:mc="http://schemas.openxmlformats.org/markup-compatibility/2006">
               <mc:Choice xmlns:v="urn:schemas-microsoft-com:vml" Requires="v">
-                <p:oleObj spid="_x0000_s237639" name="Equation" r:id="rId10" imgW="507960" imgH="419040" progId="Equation.DSMT4">
+                <p:oleObj spid="_x0000_s237658" name="Equation" r:id="rId10" imgW="507960" imgH="419040" progId="Equation.DSMT4">
                   <p:embed/>
                 </p:oleObj>
               </mc:Choice>
@@ -32876,7 +33038,7 @@
           <a:graphicData uri="http://schemas.openxmlformats.org/presentationml/2006/ole">
             <mc:AlternateContent xmlns:mc="http://schemas.openxmlformats.org/markup-compatibility/2006">
               <mc:Choice xmlns:v="urn:schemas-microsoft-com:vml" Requires="v">
-                <p:oleObj spid="_x0000_s237640" name="Equation" r:id="rId12" imgW="533160" imgH="215640" progId="Equation.DSMT4">
+                <p:oleObj spid="_x0000_s237659" name="Equation" r:id="rId12" imgW="533160" imgH="215640" progId="Equation.DSMT4">
                   <p:embed/>
                 </p:oleObj>
               </mc:Choice>
@@ -32946,7 +33108,7 @@
           <a:graphicData uri="http://schemas.openxmlformats.org/presentationml/2006/ole">
             <mc:AlternateContent xmlns:mc="http://schemas.openxmlformats.org/markup-compatibility/2006">
               <mc:Choice xmlns:v="urn:schemas-microsoft-com:vml" Requires="v">
-                <p:oleObj spid="_x0000_s237641" name="Equation" r:id="rId14" imgW="558720" imgH="203040" progId="Equation.DSMT4">
+                <p:oleObj spid="_x0000_s237660" name="Equation" r:id="rId14" imgW="558720" imgH="203040" progId="Equation.DSMT4">
                   <p:embed/>
                 </p:oleObj>
               </mc:Choice>
@@ -33127,7 +33289,7 @@
           <a:graphicData uri="http://schemas.openxmlformats.org/presentationml/2006/ole">
             <mc:AlternateContent xmlns:mc="http://schemas.openxmlformats.org/markup-compatibility/2006">
               <mc:Choice xmlns:v="urn:schemas-microsoft-com:vml" Requires="v">
-                <p:oleObj spid="_x0000_s237642" name="Equation" r:id="rId16" imgW="672840" imgH="203040" progId="Equation.DSMT4">
+                <p:oleObj spid="_x0000_s237661" name="Equation" r:id="rId16" imgW="672840" imgH="203040" progId="Equation.DSMT4">
                   <p:embed/>
                 </p:oleObj>
               </mc:Choice>
@@ -33349,7 +33511,7 @@
           <a:graphicData uri="http://schemas.openxmlformats.org/presentationml/2006/ole">
             <mc:AlternateContent xmlns:mc="http://schemas.openxmlformats.org/markup-compatibility/2006">
               <mc:Choice xmlns:v="urn:schemas-microsoft-com:vml" Requires="v">
-                <p:oleObj spid="_x0000_s237643" name="Equation" r:id="rId18" imgW="114120" imgH="177480" progId="Equation.DSMT4">
+                <p:oleObj spid="_x0000_s237662" name="Equation" r:id="rId18" imgW="114120" imgH="177480" progId="Equation.DSMT4">
                   <p:embed/>
                 </p:oleObj>
               </mc:Choice>
@@ -33419,7 +33581,7 @@
           <a:graphicData uri="http://schemas.openxmlformats.org/presentationml/2006/ole">
             <mc:AlternateContent xmlns:mc="http://schemas.openxmlformats.org/markup-compatibility/2006">
               <mc:Choice xmlns:v="urn:schemas-microsoft-com:vml" Requires="v">
-                <p:oleObj spid="_x0000_s237644" name="Equation" r:id="rId20" imgW="241200" imgH="215640" progId="Equation.DSMT4">
+                <p:oleObj spid="_x0000_s237663" name="Equation" r:id="rId20" imgW="241200" imgH="215640" progId="Equation.DSMT4">
                   <p:embed/>
                 </p:oleObj>
               </mc:Choice>
@@ -34085,7 +34247,7 @@
           <a:graphicData uri="http://schemas.openxmlformats.org/presentationml/2006/ole">
             <mc:AlternateContent xmlns:mc="http://schemas.openxmlformats.org/markup-compatibility/2006">
               <mc:Choice xmlns:v="urn:schemas-microsoft-com:vml" Requires="v">
-                <p:oleObj spid="_x0000_s402526" name="Equation" r:id="rId4" imgW="431640" imgH="190440" progId="Equation.DSMT4">
+                <p:oleObj spid="_x0000_s402545" name="Equation" r:id="rId4" imgW="431640" imgH="190440" progId="Equation.DSMT4">
                   <p:embed/>
                 </p:oleObj>
               </mc:Choice>
@@ -34194,7 +34356,7 @@
           <a:graphicData uri="http://schemas.openxmlformats.org/presentationml/2006/ole">
             <mc:AlternateContent xmlns:mc="http://schemas.openxmlformats.org/markup-compatibility/2006">
               <mc:Choice xmlns:v="urn:schemas-microsoft-com:vml" Requires="v">
-                <p:oleObj spid="_x0000_s402527" name="Equation" r:id="rId6" imgW="571320" imgH="203040" progId="Equation.DSMT4">
+                <p:oleObj spid="_x0000_s402546" name="Equation" r:id="rId6" imgW="571320" imgH="203040" progId="Equation.DSMT4">
                   <p:embed/>
                 </p:oleObj>
               </mc:Choice>
@@ -34264,7 +34426,7 @@
           <a:graphicData uri="http://schemas.openxmlformats.org/presentationml/2006/ole">
             <mc:AlternateContent xmlns:mc="http://schemas.openxmlformats.org/markup-compatibility/2006">
               <mc:Choice xmlns:v="urn:schemas-microsoft-com:vml" Requires="v">
-                <p:oleObj spid="_x0000_s402528" name="Equation" r:id="rId8" imgW="583920" imgH="215640" progId="Equation.DSMT4">
+                <p:oleObj spid="_x0000_s402547" name="Equation" r:id="rId8" imgW="583920" imgH="215640" progId="Equation.DSMT4">
                   <p:embed/>
                 </p:oleObj>
               </mc:Choice>
@@ -34434,7 +34596,7 @@
           <a:graphicData uri="http://schemas.openxmlformats.org/presentationml/2006/ole">
             <mc:AlternateContent xmlns:mc="http://schemas.openxmlformats.org/markup-compatibility/2006">
               <mc:Choice xmlns:v="urn:schemas-microsoft-com:vml" Requires="v">
-                <p:oleObj spid="_x0000_s402529" name="Equation" r:id="rId10" imgW="507960" imgH="419040" progId="Equation.DSMT4">
+                <p:oleObj spid="_x0000_s402548" name="Equation" r:id="rId10" imgW="507960" imgH="419040" progId="Equation.DSMT4">
                   <p:embed/>
                 </p:oleObj>
               </mc:Choice>
@@ -34504,7 +34666,7 @@
           <a:graphicData uri="http://schemas.openxmlformats.org/presentationml/2006/ole">
             <mc:AlternateContent xmlns:mc="http://schemas.openxmlformats.org/markup-compatibility/2006">
               <mc:Choice xmlns:v="urn:schemas-microsoft-com:vml" Requires="v">
-                <p:oleObj spid="_x0000_s402530" name="Equation" r:id="rId12" imgW="533160" imgH="215640" progId="Equation.DSMT4">
+                <p:oleObj spid="_x0000_s402549" name="Equation" r:id="rId12" imgW="533160" imgH="215640" progId="Equation.DSMT4">
                   <p:embed/>
                 </p:oleObj>
               </mc:Choice>
@@ -34574,7 +34736,7 @@
           <a:graphicData uri="http://schemas.openxmlformats.org/presentationml/2006/ole">
             <mc:AlternateContent xmlns:mc="http://schemas.openxmlformats.org/markup-compatibility/2006">
               <mc:Choice xmlns:v="urn:schemas-microsoft-com:vml" Requires="v">
-                <p:oleObj spid="_x0000_s402531" name="Equation" r:id="rId14" imgW="558720" imgH="203040" progId="Equation.DSMT4">
+                <p:oleObj spid="_x0000_s402550" name="Equation" r:id="rId14" imgW="558720" imgH="203040" progId="Equation.DSMT4">
                   <p:embed/>
                 </p:oleObj>
               </mc:Choice>
@@ -34755,7 +34917,7 @@
           <a:graphicData uri="http://schemas.openxmlformats.org/presentationml/2006/ole">
             <mc:AlternateContent xmlns:mc="http://schemas.openxmlformats.org/markup-compatibility/2006">
               <mc:Choice xmlns:v="urn:schemas-microsoft-com:vml" Requires="v">
-                <p:oleObj spid="_x0000_s402532" name="Equation" r:id="rId16" imgW="672840" imgH="203040" progId="Equation.DSMT4">
+                <p:oleObj spid="_x0000_s402551" name="Equation" r:id="rId16" imgW="672840" imgH="203040" progId="Equation.DSMT4">
                   <p:embed/>
                 </p:oleObj>
               </mc:Choice>
@@ -34977,7 +35139,7 @@
           <a:graphicData uri="http://schemas.openxmlformats.org/presentationml/2006/ole">
             <mc:AlternateContent xmlns:mc="http://schemas.openxmlformats.org/markup-compatibility/2006">
               <mc:Choice xmlns:v="urn:schemas-microsoft-com:vml" Requires="v">
-                <p:oleObj spid="_x0000_s402533" name="Equation" r:id="rId18" imgW="114120" imgH="177480" progId="Equation.DSMT4">
+                <p:oleObj spid="_x0000_s402552" name="Equation" r:id="rId18" imgW="114120" imgH="177480" progId="Equation.DSMT4">
                   <p:embed/>
                 </p:oleObj>
               </mc:Choice>
@@ -35047,7 +35209,7 @@
           <a:graphicData uri="http://schemas.openxmlformats.org/presentationml/2006/ole">
             <mc:AlternateContent xmlns:mc="http://schemas.openxmlformats.org/markup-compatibility/2006">
               <mc:Choice xmlns:v="urn:schemas-microsoft-com:vml" Requires="v">
-                <p:oleObj spid="_x0000_s402534" name="Equation" r:id="rId20" imgW="241200" imgH="215640" progId="Equation.DSMT4">
+                <p:oleObj spid="_x0000_s402553" name="Equation" r:id="rId20" imgW="241200" imgH="215640" progId="Equation.DSMT4">
                   <p:embed/>
                 </p:oleObj>
               </mc:Choice>

</xml_diff>

<commit_message>
insert --how class works-- slides from slides1f retroactively into into slides1w; add sllides 2m
</commit_message>
<xml_diff>
--- a/fall11/slidesF11/slides1f.pptx
+++ b/fall11/slidesF11/slides1f.pptx
@@ -10826,7 +10826,7 @@
             <a:graphicData uri="http://schemas.openxmlformats.org/presentationml/2006/ole">
               <mc:AlternateContent xmlns:mc="http://schemas.openxmlformats.org/markup-compatibility/2006">
                 <mc:Choice xmlns:v="urn:schemas-microsoft-com:vml" Requires="v">
-                  <p:oleObj spid="_x0000_s350231" name="Equation" r:id="rId4" imgW="228600" imgH="457200" progId="Equation.DSMT4">
+                  <p:oleObj spid="_x0000_s350234" name="Equation" r:id="rId4" imgW="228600" imgH="457200" progId="Equation.DSMT4">
                     <p:embed/>
                   </p:oleObj>
                 </mc:Choice>
@@ -10947,7 +10947,7 @@
             <a:graphicData uri="http://schemas.openxmlformats.org/presentationml/2006/ole">
               <mc:AlternateContent xmlns:mc="http://schemas.openxmlformats.org/markup-compatibility/2006">
                 <mc:Choice xmlns:v="urn:schemas-microsoft-com:vml" Requires="v">
-                  <p:oleObj spid="_x0000_s350232" name="Equation" r:id="rId6" imgW="279400" imgH="457200" progId="Equation.DSMT4">
+                  <p:oleObj spid="_x0000_s350235" name="Equation" r:id="rId6" imgW="279400" imgH="457200" progId="Equation.DSMT4">
                     <p:embed/>
                   </p:oleObj>
                 </mc:Choice>
@@ -11717,7 +11717,7 @@
           <a:graphicData uri="http://schemas.openxmlformats.org/presentationml/2006/ole">
             <mc:AlternateContent xmlns:mc="http://schemas.openxmlformats.org/markup-compatibility/2006">
               <mc:Choice xmlns:v="urn:schemas-microsoft-com:vml" Requires="v">
-                <p:oleObj spid="_x0000_s352299" name="Equation" r:id="rId4" imgW="139700" imgH="228600" progId="Equation.DSMT4">
+                <p:oleObj spid="_x0000_s352304" name="Equation" r:id="rId4" imgW="139700" imgH="228600" progId="Equation.DSMT4">
                   <p:embed/>
                 </p:oleObj>
               </mc:Choice>
@@ -11969,7 +11969,7 @@
               <a:graphicData uri="http://schemas.openxmlformats.org/presentationml/2006/ole">
                 <mc:AlternateContent xmlns:mc="http://schemas.openxmlformats.org/markup-compatibility/2006">
                   <mc:Choice xmlns:v="urn:schemas-microsoft-com:vml" Requires="v">
-                    <p:oleObj spid="_x0000_s352300" name="Equation" r:id="rId6" imgW="228600" imgH="457200" progId="Equation.DSMT4">
+                    <p:oleObj spid="_x0000_s352305" name="Equation" r:id="rId6" imgW="228600" imgH="457200" progId="Equation.DSMT4">
                       <p:embed/>
                     </p:oleObj>
                   </mc:Choice>
@@ -12090,7 +12090,7 @@
               <a:graphicData uri="http://schemas.openxmlformats.org/presentationml/2006/ole">
                 <mc:AlternateContent xmlns:mc="http://schemas.openxmlformats.org/markup-compatibility/2006">
                   <mc:Choice xmlns:v="urn:schemas-microsoft-com:vml" Requires="v">
-                    <p:oleObj spid="_x0000_s352301" name="Equation" r:id="rId8" imgW="228600" imgH="457200" progId="Equation.DSMT4">
+                    <p:oleObj spid="_x0000_s352306" name="Equation" r:id="rId8" imgW="228600" imgH="457200" progId="Equation.DSMT4">
                       <p:embed/>
                     </p:oleObj>
                   </mc:Choice>
@@ -12211,7 +12211,7 @@
               <a:graphicData uri="http://schemas.openxmlformats.org/presentationml/2006/ole">
                 <mc:AlternateContent xmlns:mc="http://schemas.openxmlformats.org/markup-compatibility/2006">
                   <mc:Choice xmlns:v="urn:schemas-microsoft-com:vml" Requires="v">
-                    <p:oleObj spid="_x0000_s352302" name="Equation" r:id="rId10" imgW="279400" imgH="457200" progId="Equation.DSMT4">
+                    <p:oleObj spid="_x0000_s352307" name="Equation" r:id="rId10" imgW="279400" imgH="457200" progId="Equation.DSMT4">
                       <p:embed/>
                     </p:oleObj>
                   </mc:Choice>
@@ -13103,7 +13103,7 @@
               <a:graphicData uri="http://schemas.openxmlformats.org/presentationml/2006/ole">
                 <mc:AlternateContent xmlns:mc="http://schemas.openxmlformats.org/markup-compatibility/2006">
                   <mc:Choice xmlns:v="urn:schemas-microsoft-com:vml" Requires="v">
-                    <p:oleObj spid="_x0000_s354336" name="Equation" r:id="rId4" imgW="228600" imgH="457200" progId="Equation.DSMT4">
+                    <p:oleObj spid="_x0000_s354340" name="Equation" r:id="rId4" imgW="228600" imgH="457200" progId="Equation.DSMT4">
                       <p:embed/>
                     </p:oleObj>
                   </mc:Choice>
@@ -13224,7 +13224,7 @@
               <a:graphicData uri="http://schemas.openxmlformats.org/presentationml/2006/ole">
                 <mc:AlternateContent xmlns:mc="http://schemas.openxmlformats.org/markup-compatibility/2006">
                   <mc:Choice xmlns:v="urn:schemas-microsoft-com:vml" Requires="v">
-                    <p:oleObj spid="_x0000_s354337" name="Equation" r:id="rId6" imgW="228600" imgH="457200" progId="Equation.DSMT4">
+                    <p:oleObj spid="_x0000_s354341" name="Equation" r:id="rId6" imgW="228600" imgH="457200" progId="Equation.DSMT4">
                       <p:embed/>
                     </p:oleObj>
                   </mc:Choice>
@@ -13345,7 +13345,7 @@
               <a:graphicData uri="http://schemas.openxmlformats.org/presentationml/2006/ole">
                 <mc:AlternateContent xmlns:mc="http://schemas.openxmlformats.org/markup-compatibility/2006">
                   <mc:Choice xmlns:v="urn:schemas-microsoft-com:vml" Requires="v">
-                    <p:oleObj spid="_x0000_s354338" name="Equation" r:id="rId8" imgW="279400" imgH="457200" progId="Equation.DSMT4">
+                    <p:oleObj spid="_x0000_s354342" name="Equation" r:id="rId8" imgW="279400" imgH="457200" progId="Equation.DSMT4">
                       <p:embed/>
                     </p:oleObj>
                   </mc:Choice>
@@ -13947,7 +13947,7 @@
             <a:graphicData uri="http://schemas.openxmlformats.org/presentationml/2006/ole">
               <mc:AlternateContent xmlns:mc="http://schemas.openxmlformats.org/markup-compatibility/2006">
                 <mc:Choice xmlns:v="urn:schemas-microsoft-com:vml" Requires="v">
-                  <p:oleObj spid="_x0000_s356369" name="Equation" r:id="rId4" imgW="279400" imgH="457200" progId="Equation.DSMT4">
+                  <p:oleObj spid="_x0000_s356371" name="Equation" r:id="rId4" imgW="279400" imgH="457200" progId="Equation.DSMT4">
                     <p:embed/>
                   </p:oleObj>
                 </mc:Choice>
@@ -20304,7 +20304,7 @@
           <a:graphicData uri="http://schemas.openxmlformats.org/presentationml/2006/ole">
             <mc:AlternateContent xmlns:mc="http://schemas.openxmlformats.org/markup-compatibility/2006">
               <mc:Choice xmlns:v="urn:schemas-microsoft-com:vml" Requires="v">
-                <p:oleObj spid="_x0000_s334890" name="Equation" r:id="rId4" imgW="241200" imgH="419040" progId="Equation.DSMT4">
+                <p:oleObj spid="_x0000_s334895" name="Equation" r:id="rId4" imgW="241200" imgH="419040" progId="Equation.DSMT4">
                   <p:embed/>
                 </p:oleObj>
               </mc:Choice>
@@ -20374,7 +20374,7 @@
           <a:graphicData uri="http://schemas.openxmlformats.org/presentationml/2006/ole">
             <mc:AlternateContent xmlns:mc="http://schemas.openxmlformats.org/markup-compatibility/2006">
               <mc:Choice xmlns:v="urn:schemas-microsoft-com:vml" Requires="v">
-                <p:oleObj spid="_x0000_s334891" name="Equation" r:id="rId6" imgW="3035160" imgH="533160" progId="Equation.DSMT4">
+                <p:oleObj spid="_x0000_s334896" name="Equation" r:id="rId6" imgW="3035160" imgH="533160" progId="Equation.DSMT4">
                   <p:embed/>
                 </p:oleObj>
               </mc:Choice>
@@ -20444,7 +20444,7 @@
           <a:graphicData uri="http://schemas.openxmlformats.org/presentationml/2006/ole">
             <mc:AlternateContent xmlns:mc="http://schemas.openxmlformats.org/markup-compatibility/2006">
               <mc:Choice xmlns:v="urn:schemas-microsoft-com:vml" Requires="v">
-                <p:oleObj spid="_x0000_s334892" name="Equation" r:id="rId8" imgW="901440" imgH="355320" progId="Equation.DSMT4">
+                <p:oleObj spid="_x0000_s334897" name="Equation" r:id="rId8" imgW="901440" imgH="355320" progId="Equation.DSMT4">
                   <p:embed/>
                 </p:oleObj>
               </mc:Choice>
@@ -20530,7 +20530,7 @@
           <a:graphicData uri="http://schemas.openxmlformats.org/presentationml/2006/ole">
             <mc:AlternateContent xmlns:mc="http://schemas.openxmlformats.org/markup-compatibility/2006">
               <mc:Choice xmlns:v="urn:schemas-microsoft-com:vml" Requires="v">
-                <p:oleObj spid="_x0000_s334893" name="Equation" r:id="rId10" imgW="3695700" imgH="673100" progId="Equation.DSMT4">
+                <p:oleObj spid="_x0000_s334898" name="Equation" r:id="rId10" imgW="3695700" imgH="673100" progId="Equation.DSMT4">
                   <p:embed/>
                 </p:oleObj>
               </mc:Choice>
@@ -27045,7 +27045,7 @@
           <a:graphicData uri="http://schemas.openxmlformats.org/presentationml/2006/ole">
             <mc:AlternateContent xmlns:mc="http://schemas.openxmlformats.org/markup-compatibility/2006">
               <mc:Choice xmlns:v="urn:schemas-microsoft-com:vml" Requires="v">
-                <p:oleObj spid="_x0000_s332850" name="Equation" r:id="rId4" imgW="558720" imgH="190440" progId="Equation.DSMT4">
+                <p:oleObj spid="_x0000_s332856" name="Equation" r:id="rId4" imgW="558720" imgH="190440" progId="Equation.DSMT4">
                   <p:embed/>
                 </p:oleObj>
               </mc:Choice>
@@ -27115,7 +27115,7 @@
           <a:graphicData uri="http://schemas.openxmlformats.org/presentationml/2006/ole">
             <mc:AlternateContent xmlns:mc="http://schemas.openxmlformats.org/markup-compatibility/2006">
               <mc:Choice xmlns:v="urn:schemas-microsoft-com:vml" Requires="v">
-                <p:oleObj spid="_x0000_s332851" name="Equation" r:id="rId6" imgW="545760" imgH="177480" progId="Equation.DSMT4">
+                <p:oleObj spid="_x0000_s332857" name="Equation" r:id="rId6" imgW="545760" imgH="177480" progId="Equation.DSMT4">
                   <p:embed/>
                 </p:oleObj>
               </mc:Choice>
@@ -27185,7 +27185,7 @@
           <a:graphicData uri="http://schemas.openxmlformats.org/presentationml/2006/ole">
             <mc:AlternateContent xmlns:mc="http://schemas.openxmlformats.org/markup-compatibility/2006">
               <mc:Choice xmlns:v="urn:schemas-microsoft-com:vml" Requires="v">
-                <p:oleObj spid="_x0000_s332852" name="Equation" r:id="rId8" imgW="545760" imgH="177480" progId="Equation.DSMT4">
+                <p:oleObj spid="_x0000_s332858" name="Equation" r:id="rId8" imgW="545760" imgH="177480" progId="Equation.DSMT4">
                   <p:embed/>
                 </p:oleObj>
               </mc:Choice>
@@ -27294,7 +27294,7 @@
           <a:graphicData uri="http://schemas.openxmlformats.org/presentationml/2006/ole">
             <mc:AlternateContent xmlns:mc="http://schemas.openxmlformats.org/markup-compatibility/2006">
               <mc:Choice xmlns:v="urn:schemas-microsoft-com:vml" Requires="v">
-                <p:oleObj spid="_x0000_s332853" name="Equation" r:id="rId10" imgW="444240" imgH="368280" progId="Equation.DSMT4">
+                <p:oleObj spid="_x0000_s332859" name="Equation" r:id="rId10" imgW="444240" imgH="368280" progId="Equation.DSMT4">
                   <p:embed/>
                 </p:oleObj>
               </mc:Choice>
@@ -27364,7 +27364,7 @@
           <a:graphicData uri="http://schemas.openxmlformats.org/presentationml/2006/ole">
             <mc:AlternateContent xmlns:mc="http://schemas.openxmlformats.org/markup-compatibility/2006">
               <mc:Choice xmlns:v="urn:schemas-microsoft-com:vml" Requires="v">
-                <p:oleObj spid="_x0000_s332854" name="Equation" r:id="rId12" imgW="406080" imgH="177480" progId="Equation.DSMT4">
+                <p:oleObj spid="_x0000_s332860" name="Equation" r:id="rId12" imgW="406080" imgH="177480" progId="Equation.DSMT4">
                   <p:embed/>
                 </p:oleObj>
               </mc:Choice>
@@ -28195,7 +28195,7 @@
           <a:graphicData uri="http://schemas.openxmlformats.org/presentationml/2006/ole">
             <mc:AlternateContent xmlns:mc="http://schemas.openxmlformats.org/markup-compatibility/2006">
               <mc:Choice xmlns:v="urn:schemas-microsoft-com:vml" Requires="v">
-                <p:oleObj spid="_x0000_s327694" name="Equation" r:id="rId4" imgW="914400" imgH="406080" progId="Equation.DSMT4">
+                <p:oleObj spid="_x0000_s327696" name="Equation" r:id="rId4" imgW="914400" imgH="406080" progId="Equation.DSMT4">
                   <p:embed/>
                 </p:oleObj>
               </mc:Choice>
@@ -29127,7 +29127,7 @@
 </file>
 
 <file path=ppt/slides/slide33.xml><?xml version="1.0" encoding="utf-8"?>
-<p:sld xmlns:a="http://schemas.openxmlformats.org/drawingml/2006/main" xmlns:r="http://schemas.openxmlformats.org/officeDocument/2006/relationships" xmlns:p="http://schemas.openxmlformats.org/presentationml/2006/main">
+<p:sld xmlns:a="http://schemas.openxmlformats.org/drawingml/2006/main" xmlns:r="http://schemas.openxmlformats.org/officeDocument/2006/relationships" xmlns:p="http://schemas.openxmlformats.org/presentationml/2006/main" show="0">
   <p:cSld>
     <p:spTree>
       <p:nvGrpSpPr>
@@ -29788,7 +29788,7 @@
 </file>
 
 <file path=ppt/slides/slide34.xml><?xml version="1.0" encoding="utf-8"?>
-<p:sld xmlns:a="http://schemas.openxmlformats.org/drawingml/2006/main" xmlns:r="http://schemas.openxmlformats.org/officeDocument/2006/relationships" xmlns:p="http://schemas.openxmlformats.org/presentationml/2006/main">
+<p:sld xmlns:a="http://schemas.openxmlformats.org/drawingml/2006/main" xmlns:r="http://schemas.openxmlformats.org/officeDocument/2006/relationships" xmlns:p="http://schemas.openxmlformats.org/presentationml/2006/main" show="0">
   <p:cSld>
     <p:spTree>
       <p:nvGrpSpPr>
@@ -30498,7 +30498,7 @@
 </file>
 
 <file path=ppt/slides/slide35.xml><?xml version="1.0" encoding="utf-8"?>
-<p:sld xmlns:a="http://schemas.openxmlformats.org/drawingml/2006/main" xmlns:r="http://schemas.openxmlformats.org/officeDocument/2006/relationships" xmlns:p="http://schemas.openxmlformats.org/presentationml/2006/main">
+<p:sld xmlns:a="http://schemas.openxmlformats.org/drawingml/2006/main" xmlns:r="http://schemas.openxmlformats.org/officeDocument/2006/relationships" xmlns:p="http://schemas.openxmlformats.org/presentationml/2006/main" show="0">
   <p:cSld>
     <p:spTree>
       <p:nvGrpSpPr>
@@ -30618,13 +30618,7 @@
               <a:rPr lang="en-US" sz="6000" dirty="0" smtClean="0">
                 <a:latin typeface="Comic Sans MS" pitchFamily="66" charset="0"/>
               </a:rPr>
-              <a:t> and </a:t>
-            </a:r>
-            <a:r>
-              <a:rPr lang="en-US" sz="6000" dirty="0" smtClean="0">
-                <a:latin typeface="Comic Sans MS" pitchFamily="66" charset="0"/>
-              </a:rPr>
-              <a:t>control the </a:t>
+              <a:t> and control the </a:t>
             </a:r>
             <a:r>
               <a:rPr lang="en-US" sz="6000" dirty="0" smtClean="0">
@@ -30648,14 +30642,6 @@
               </a:rPr>
               <a:t>(me too)</a:t>
             </a:r>
-            <a:endParaRPr lang="en-US" sz="6000" dirty="0" smtClean="0">
-              <a:solidFill>
-                <a:schemeClr val="accent1">
-                  <a:lumMod val="75000"/>
-                </a:schemeClr>
-              </a:solidFill>
-              <a:latin typeface="Comic Sans MS" pitchFamily="66" charset="0"/>
-            </a:endParaRPr>
           </a:p>
         </p:txBody>
       </p:sp>
@@ -30706,7 +30692,7 @@
           <a:graphicData uri="http://schemas.openxmlformats.org/presentationml/2006/ole">
             <mc:AlternateContent xmlns:mc="http://schemas.openxmlformats.org/markup-compatibility/2006">
               <mc:Choice xmlns:v="urn:schemas-microsoft-com:vml" Requires="v">
-                <p:oleObj spid="_x0000_s337975" name="Equation" r:id="rId4" imgW="2984500" imgH="596900" progId="Equation.DSMT4">
+                <p:oleObj spid="_x0000_s337981" name="Equation" r:id="rId4" imgW="2984500" imgH="596900" progId="Equation.DSMT4">
                   <p:embed/>
                 </p:oleObj>
               </mc:Choice>
@@ -30799,7 +30785,7 @@
           <a:graphicData uri="http://schemas.openxmlformats.org/presentationml/2006/ole">
             <mc:AlternateContent xmlns:mc="http://schemas.openxmlformats.org/markup-compatibility/2006">
               <mc:Choice xmlns:v="urn:schemas-microsoft-com:vml" Requires="v">
-                <p:oleObj spid="_x0000_s337976" name="Equation" r:id="rId6" imgW="3759200" imgH="673100" progId="Equation.DSMT4">
+                <p:oleObj spid="_x0000_s337982" name="Equation" r:id="rId6" imgW="3759200" imgH="673100" progId="Equation.DSMT4">
                   <p:embed/>
                 </p:oleObj>
               </mc:Choice>
@@ -30919,7 +30905,7 @@
           <a:graphicData uri="http://schemas.openxmlformats.org/presentationml/2006/ole">
             <mc:AlternateContent xmlns:mc="http://schemas.openxmlformats.org/markup-compatibility/2006">
               <mc:Choice xmlns:v="urn:schemas-microsoft-com:vml" Requires="v">
-                <p:oleObj spid="_x0000_s337977" name="Equation" r:id="rId8" imgW="253800" imgH="317160" progId="Equation.DSMT4">
+                <p:oleObj spid="_x0000_s337983" name="Equation" r:id="rId8" imgW="253800" imgH="317160" progId="Equation.DSMT4">
                   <p:embed/>
                 </p:oleObj>
               </mc:Choice>
@@ -30982,7 +30968,7 @@
           <a:graphicData uri="http://schemas.openxmlformats.org/presentationml/2006/ole">
             <mc:AlternateContent xmlns:mc="http://schemas.openxmlformats.org/markup-compatibility/2006">
               <mc:Choice xmlns:v="urn:schemas-microsoft-com:vml" Requires="v">
-                <p:oleObj spid="_x0000_s337978" name="Equation" r:id="rId10" imgW="2057400" imgH="533160" progId="Equation.DSMT4">
+                <p:oleObj spid="_x0000_s337984" name="Equation" r:id="rId10" imgW="2057400" imgH="533160" progId="Equation.DSMT4">
                   <p:embed/>
                 </p:oleObj>
               </mc:Choice>
@@ -31099,7 +31085,7 @@
           <a:graphicData uri="http://schemas.openxmlformats.org/presentationml/2006/ole">
             <mc:AlternateContent xmlns:mc="http://schemas.openxmlformats.org/markup-compatibility/2006">
               <mc:Choice xmlns:v="urn:schemas-microsoft-com:vml" Requires="v">
-                <p:oleObj spid="_x0000_s337979" name="Equation" r:id="rId12" imgW="876300" imgH="368300" progId="Equation.DSMT4">
+                <p:oleObj spid="_x0000_s337985" name="Equation" r:id="rId12" imgW="876300" imgH="368300" progId="Equation.DSMT4">
                   <p:embed/>
                 </p:oleObj>
               </mc:Choice>
@@ -31973,7 +31959,7 @@
           <a:graphicData uri="http://schemas.openxmlformats.org/presentationml/2006/ole">
             <mc:AlternateContent xmlns:mc="http://schemas.openxmlformats.org/markup-compatibility/2006">
               <mc:Choice xmlns:v="urn:schemas-microsoft-com:vml" Requires="v">
-                <p:oleObj spid="_x0000_s248867" name="Equation" r:id="rId4" imgW="241200" imgH="215640" progId="Equation.DSMT4">
+                <p:oleObj spid="_x0000_s248871" name="Equation" r:id="rId4" imgW="241200" imgH="215640" progId="Equation.DSMT4">
                   <p:embed/>
                 </p:oleObj>
               </mc:Choice>
@@ -32043,7 +32029,7 @@
           <a:graphicData uri="http://schemas.openxmlformats.org/presentationml/2006/ole">
             <mc:AlternateContent xmlns:mc="http://schemas.openxmlformats.org/markup-compatibility/2006">
               <mc:Choice xmlns:v="urn:schemas-microsoft-com:vml" Requires="v">
-                <p:oleObj spid="_x0000_s248868" name="Equation" r:id="rId6" imgW="241200" imgH="215640" progId="Equation.DSMT4">
+                <p:oleObj spid="_x0000_s248872" name="Equation" r:id="rId6" imgW="241200" imgH="215640" progId="Equation.DSMT4">
                   <p:embed/>
                 </p:oleObj>
               </mc:Choice>
@@ -32113,7 +32099,7 @@
           <a:graphicData uri="http://schemas.openxmlformats.org/presentationml/2006/ole">
             <mc:AlternateContent xmlns:mc="http://schemas.openxmlformats.org/markup-compatibility/2006">
               <mc:Choice xmlns:v="urn:schemas-microsoft-com:vml" Requires="v">
-                <p:oleObj spid="_x0000_s248869" name="Equation" r:id="rId8" imgW="507960" imgH="419040" progId="Equation.DSMT4">
+                <p:oleObj spid="_x0000_s248873" name="Equation" r:id="rId8" imgW="507960" imgH="419040" progId="Equation.DSMT4">
                   <p:embed/>
                 </p:oleObj>
               </mc:Choice>
@@ -32619,7 +32605,7 @@
           <a:graphicData uri="http://schemas.openxmlformats.org/presentationml/2006/ole">
             <mc:AlternateContent xmlns:mc="http://schemas.openxmlformats.org/markup-compatibility/2006">
               <mc:Choice xmlns:v="urn:schemas-microsoft-com:vml" Requires="v">
-                <p:oleObj spid="_x0000_s237655" name="Equation" r:id="rId4" imgW="431640" imgH="190440" progId="Equation.DSMT4">
+                <p:oleObj spid="_x0000_s237665" name="Equation" r:id="rId4" imgW="431640" imgH="190440" progId="Equation.DSMT4">
                   <p:embed/>
                 </p:oleObj>
               </mc:Choice>
@@ -32728,7 +32714,7 @@
           <a:graphicData uri="http://schemas.openxmlformats.org/presentationml/2006/ole">
             <mc:AlternateContent xmlns:mc="http://schemas.openxmlformats.org/markup-compatibility/2006">
               <mc:Choice xmlns:v="urn:schemas-microsoft-com:vml" Requires="v">
-                <p:oleObj spid="_x0000_s237656" name="Equation" r:id="rId6" imgW="571320" imgH="203040" progId="Equation.DSMT4">
+                <p:oleObj spid="_x0000_s237666" name="Equation" r:id="rId6" imgW="571320" imgH="203040" progId="Equation.DSMT4">
                   <p:embed/>
                 </p:oleObj>
               </mc:Choice>
@@ -32798,7 +32784,7 @@
           <a:graphicData uri="http://schemas.openxmlformats.org/presentationml/2006/ole">
             <mc:AlternateContent xmlns:mc="http://schemas.openxmlformats.org/markup-compatibility/2006">
               <mc:Choice xmlns:v="urn:schemas-microsoft-com:vml" Requires="v">
-                <p:oleObj spid="_x0000_s237657" name="Equation" r:id="rId8" imgW="583920" imgH="215640" progId="Equation.DSMT4">
+                <p:oleObj spid="_x0000_s237667" name="Equation" r:id="rId8" imgW="583920" imgH="215640" progId="Equation.DSMT4">
                   <p:embed/>
                 </p:oleObj>
               </mc:Choice>
@@ -32968,7 +32954,7 @@
           <a:graphicData uri="http://schemas.openxmlformats.org/presentationml/2006/ole">
             <mc:AlternateContent xmlns:mc="http://schemas.openxmlformats.org/markup-compatibility/2006">
               <mc:Choice xmlns:v="urn:schemas-microsoft-com:vml" Requires="v">
-                <p:oleObj spid="_x0000_s237658" name="Equation" r:id="rId10" imgW="507960" imgH="419040" progId="Equation.DSMT4">
+                <p:oleObj spid="_x0000_s237668" name="Equation" r:id="rId10" imgW="507960" imgH="419040" progId="Equation.DSMT4">
                   <p:embed/>
                 </p:oleObj>
               </mc:Choice>
@@ -33038,7 +33024,7 @@
           <a:graphicData uri="http://schemas.openxmlformats.org/presentationml/2006/ole">
             <mc:AlternateContent xmlns:mc="http://schemas.openxmlformats.org/markup-compatibility/2006">
               <mc:Choice xmlns:v="urn:schemas-microsoft-com:vml" Requires="v">
-                <p:oleObj spid="_x0000_s237659" name="Equation" r:id="rId12" imgW="533160" imgH="215640" progId="Equation.DSMT4">
+                <p:oleObj spid="_x0000_s237669" name="Equation" r:id="rId12" imgW="533160" imgH="215640" progId="Equation.DSMT4">
                   <p:embed/>
                 </p:oleObj>
               </mc:Choice>
@@ -33108,7 +33094,7 @@
           <a:graphicData uri="http://schemas.openxmlformats.org/presentationml/2006/ole">
             <mc:AlternateContent xmlns:mc="http://schemas.openxmlformats.org/markup-compatibility/2006">
               <mc:Choice xmlns:v="urn:schemas-microsoft-com:vml" Requires="v">
-                <p:oleObj spid="_x0000_s237660" name="Equation" r:id="rId14" imgW="558720" imgH="203040" progId="Equation.DSMT4">
+                <p:oleObj spid="_x0000_s237670" name="Equation" r:id="rId14" imgW="558720" imgH="203040" progId="Equation.DSMT4">
                   <p:embed/>
                 </p:oleObj>
               </mc:Choice>
@@ -33289,7 +33275,7 @@
           <a:graphicData uri="http://schemas.openxmlformats.org/presentationml/2006/ole">
             <mc:AlternateContent xmlns:mc="http://schemas.openxmlformats.org/markup-compatibility/2006">
               <mc:Choice xmlns:v="urn:schemas-microsoft-com:vml" Requires="v">
-                <p:oleObj spid="_x0000_s237661" name="Equation" r:id="rId16" imgW="672840" imgH="203040" progId="Equation.DSMT4">
+                <p:oleObj spid="_x0000_s237671" name="Equation" r:id="rId16" imgW="672840" imgH="203040" progId="Equation.DSMT4">
                   <p:embed/>
                 </p:oleObj>
               </mc:Choice>
@@ -33511,7 +33497,7 @@
           <a:graphicData uri="http://schemas.openxmlformats.org/presentationml/2006/ole">
             <mc:AlternateContent xmlns:mc="http://schemas.openxmlformats.org/markup-compatibility/2006">
               <mc:Choice xmlns:v="urn:schemas-microsoft-com:vml" Requires="v">
-                <p:oleObj spid="_x0000_s237662" name="Equation" r:id="rId18" imgW="114120" imgH="177480" progId="Equation.DSMT4">
+                <p:oleObj spid="_x0000_s237672" name="Equation" r:id="rId18" imgW="114120" imgH="177480" progId="Equation.DSMT4">
                   <p:embed/>
                 </p:oleObj>
               </mc:Choice>
@@ -33581,7 +33567,7 @@
           <a:graphicData uri="http://schemas.openxmlformats.org/presentationml/2006/ole">
             <mc:AlternateContent xmlns:mc="http://schemas.openxmlformats.org/markup-compatibility/2006">
               <mc:Choice xmlns:v="urn:schemas-microsoft-com:vml" Requires="v">
-                <p:oleObj spid="_x0000_s237663" name="Equation" r:id="rId20" imgW="241200" imgH="215640" progId="Equation.DSMT4">
+                <p:oleObj spid="_x0000_s237673" name="Equation" r:id="rId20" imgW="241200" imgH="215640" progId="Equation.DSMT4">
                   <p:embed/>
                 </p:oleObj>
               </mc:Choice>
@@ -34247,7 +34233,7 @@
           <a:graphicData uri="http://schemas.openxmlformats.org/presentationml/2006/ole">
             <mc:AlternateContent xmlns:mc="http://schemas.openxmlformats.org/markup-compatibility/2006">
               <mc:Choice xmlns:v="urn:schemas-microsoft-com:vml" Requires="v">
-                <p:oleObj spid="_x0000_s402545" name="Equation" r:id="rId4" imgW="431640" imgH="190440" progId="Equation.DSMT4">
+                <p:oleObj spid="_x0000_s402555" name="Equation" r:id="rId4" imgW="431640" imgH="190440" progId="Equation.DSMT4">
                   <p:embed/>
                 </p:oleObj>
               </mc:Choice>
@@ -34356,7 +34342,7 @@
           <a:graphicData uri="http://schemas.openxmlformats.org/presentationml/2006/ole">
             <mc:AlternateContent xmlns:mc="http://schemas.openxmlformats.org/markup-compatibility/2006">
               <mc:Choice xmlns:v="urn:schemas-microsoft-com:vml" Requires="v">
-                <p:oleObj spid="_x0000_s402546" name="Equation" r:id="rId6" imgW="571320" imgH="203040" progId="Equation.DSMT4">
+                <p:oleObj spid="_x0000_s402556" name="Equation" r:id="rId6" imgW="571320" imgH="203040" progId="Equation.DSMT4">
                   <p:embed/>
                 </p:oleObj>
               </mc:Choice>
@@ -34426,7 +34412,7 @@
           <a:graphicData uri="http://schemas.openxmlformats.org/presentationml/2006/ole">
             <mc:AlternateContent xmlns:mc="http://schemas.openxmlformats.org/markup-compatibility/2006">
               <mc:Choice xmlns:v="urn:schemas-microsoft-com:vml" Requires="v">
-                <p:oleObj spid="_x0000_s402547" name="Equation" r:id="rId8" imgW="583920" imgH="215640" progId="Equation.DSMT4">
+                <p:oleObj spid="_x0000_s402557" name="Equation" r:id="rId8" imgW="583920" imgH="215640" progId="Equation.DSMT4">
                   <p:embed/>
                 </p:oleObj>
               </mc:Choice>
@@ -34596,7 +34582,7 @@
           <a:graphicData uri="http://schemas.openxmlformats.org/presentationml/2006/ole">
             <mc:AlternateContent xmlns:mc="http://schemas.openxmlformats.org/markup-compatibility/2006">
               <mc:Choice xmlns:v="urn:schemas-microsoft-com:vml" Requires="v">
-                <p:oleObj spid="_x0000_s402548" name="Equation" r:id="rId10" imgW="507960" imgH="419040" progId="Equation.DSMT4">
+                <p:oleObj spid="_x0000_s402558" name="Equation" r:id="rId10" imgW="507960" imgH="419040" progId="Equation.DSMT4">
                   <p:embed/>
                 </p:oleObj>
               </mc:Choice>
@@ -34666,7 +34652,7 @@
           <a:graphicData uri="http://schemas.openxmlformats.org/presentationml/2006/ole">
             <mc:AlternateContent xmlns:mc="http://schemas.openxmlformats.org/markup-compatibility/2006">
               <mc:Choice xmlns:v="urn:schemas-microsoft-com:vml" Requires="v">
-                <p:oleObj spid="_x0000_s402549" name="Equation" r:id="rId12" imgW="533160" imgH="215640" progId="Equation.DSMT4">
+                <p:oleObj spid="_x0000_s402559" name="Equation" r:id="rId12" imgW="533160" imgH="215640" progId="Equation.DSMT4">
                   <p:embed/>
                 </p:oleObj>
               </mc:Choice>
@@ -34736,7 +34722,7 @@
           <a:graphicData uri="http://schemas.openxmlformats.org/presentationml/2006/ole">
             <mc:AlternateContent xmlns:mc="http://schemas.openxmlformats.org/markup-compatibility/2006">
               <mc:Choice xmlns:v="urn:schemas-microsoft-com:vml" Requires="v">
-                <p:oleObj spid="_x0000_s402550" name="Equation" r:id="rId14" imgW="558720" imgH="203040" progId="Equation.DSMT4">
+                <p:oleObj spid="_x0000_s402560" name="Equation" r:id="rId14" imgW="558720" imgH="203040" progId="Equation.DSMT4">
                   <p:embed/>
                 </p:oleObj>
               </mc:Choice>
@@ -34917,7 +34903,7 @@
           <a:graphicData uri="http://schemas.openxmlformats.org/presentationml/2006/ole">
             <mc:AlternateContent xmlns:mc="http://schemas.openxmlformats.org/markup-compatibility/2006">
               <mc:Choice xmlns:v="urn:schemas-microsoft-com:vml" Requires="v">
-                <p:oleObj spid="_x0000_s402551" name="Equation" r:id="rId16" imgW="672840" imgH="203040" progId="Equation.DSMT4">
+                <p:oleObj spid="_x0000_s402561" name="Equation" r:id="rId16" imgW="672840" imgH="203040" progId="Equation.DSMT4">
                   <p:embed/>
                 </p:oleObj>
               </mc:Choice>
@@ -35139,7 +35125,7 @@
           <a:graphicData uri="http://schemas.openxmlformats.org/presentationml/2006/ole">
             <mc:AlternateContent xmlns:mc="http://schemas.openxmlformats.org/markup-compatibility/2006">
               <mc:Choice xmlns:v="urn:schemas-microsoft-com:vml" Requires="v">
-                <p:oleObj spid="_x0000_s402552" name="Equation" r:id="rId18" imgW="114120" imgH="177480" progId="Equation.DSMT4">
+                <p:oleObj spid="_x0000_s402562" name="Equation" r:id="rId18" imgW="114120" imgH="177480" progId="Equation.DSMT4">
                   <p:embed/>
                 </p:oleObj>
               </mc:Choice>
@@ -35209,7 +35195,7 @@
           <a:graphicData uri="http://schemas.openxmlformats.org/presentationml/2006/ole">
             <mc:AlternateContent xmlns:mc="http://schemas.openxmlformats.org/markup-compatibility/2006">
               <mc:Choice xmlns:v="urn:schemas-microsoft-com:vml" Requires="v">
-                <p:oleObj spid="_x0000_s402553" name="Equation" r:id="rId20" imgW="241200" imgH="215640" progId="Equation.DSMT4">
+                <p:oleObj spid="_x0000_s402563" name="Equation" r:id="rId20" imgW="241200" imgH="215640" progId="Equation.DSMT4">
                   <p:embed/>
                 </p:oleObj>
               </mc:Choice>

</xml_diff>